<commit_message>
Update project award slide, images and diagrams
</commit_message>
<xml_diff>
--- a/pptx/ProjectAward.pptx
+++ b/pptx/ProjectAward.pptx
@@ -5,26 +5,27 @@
     <p:sldMasterId id="2147483660" r:id="rId4"/>
   </p:sldMasterIdLst>
   <p:notesMasterIdLst>
-    <p:notesMasterId r:id="rId12"/>
+    <p:notesMasterId r:id="rId13"/>
   </p:notesMasterIdLst>
   <p:sldIdLst>
     <p:sldId id="297" r:id="rId5"/>
     <p:sldId id="299" r:id="rId6"/>
-    <p:sldId id="311" r:id="rId7"/>
-    <p:sldId id="309" r:id="rId8"/>
-    <p:sldId id="298" r:id="rId9"/>
-    <p:sldId id="310" r:id="rId10"/>
-    <p:sldId id="262" r:id="rId11"/>
+    <p:sldId id="312" r:id="rId7"/>
+    <p:sldId id="311" r:id="rId8"/>
+    <p:sldId id="309" r:id="rId9"/>
+    <p:sldId id="298" r:id="rId10"/>
+    <p:sldId id="310" r:id="rId11"/>
+    <p:sldId id="313" r:id="rId12"/>
   </p:sldIdLst>
   <p:sldSz cx="9144000" cy="5143500" type="screen16x9"/>
   <p:notesSz cx="6858000" cy="9144000"/>
   <p:embeddedFontLst>
     <p:embeddedFont>
       <p:font typeface="Fira Sans" panose="020B0503050000020004" pitchFamily="34" charset="0"/>
-      <p:regular r:id="rId13"/>
-      <p:bold r:id="rId14"/>
-      <p:italic r:id="rId15"/>
-      <p:boldItalic r:id="rId16"/>
+      <p:regular r:id="rId14"/>
+      <p:bold r:id="rId15"/>
+      <p:italic r:id="rId16"/>
+      <p:boldItalic r:id="rId17"/>
     </p:embeddedFont>
   </p:embeddedFontLst>
   <p:defaultTextStyle>
@@ -288,8 +289,7 @@
 <file path=ppt/revisionInfo.xml><?xml version="1.0" encoding="utf-8"?>
 <p1510:revInfo xmlns:a="http://schemas.openxmlformats.org/drawingml/2006/main" xmlns:r="http://schemas.openxmlformats.org/officeDocument/2006/relationships" xmlns:p1510="http://schemas.microsoft.com/office/powerpoint/2015/10/main">
   <p1510:revLst>
-    <p1510:client id="{2A46F054-6153-40BA-8163-02DDCDED3C39}" v="1" dt="2023-02-28T12:21:03.259"/>
-    <p1510:client id="{F6FA1787-67E0-47F4-BAB0-36BA10F93569}" v="69" dt="2023-02-28T13:52:37.057"/>
+    <p1510:client id="{73DE76B5-7189-478F-BA36-61568D6537D4}" v="3" dt="2023-03-06T19:11:22.759"/>
   </p1510:revLst>
 </p1510:revInfo>
 </file>
@@ -635,6 +635,193 @@
     </pc:docChg>
   </pc:docChgLst>
   <pc:docChgLst>
+    <pc:chgData name="Simon RS" userId="8de322db93951f0c" providerId="LiveId" clId="{73DE76B5-7189-478F-BA36-61568D6537D4}"/>
+    <pc:docChg chg="undo custSel addSld delSld modSld">
+      <pc:chgData name="Simon RS" userId="8de322db93951f0c" providerId="LiveId" clId="{73DE76B5-7189-478F-BA36-61568D6537D4}" dt="2023-03-06T19:46:21.184" v="335" actId="20577"/>
+      <pc:docMkLst>
+        <pc:docMk/>
+      </pc:docMkLst>
+      <pc:sldChg chg="del">
+        <pc:chgData name="Simon RS" userId="8de322db93951f0c" providerId="LiveId" clId="{73DE76B5-7189-478F-BA36-61568D6537D4}" dt="2023-03-06T18:59:31.036" v="198" actId="47"/>
+        <pc:sldMkLst>
+          <pc:docMk/>
+          <pc:sldMk cId="0" sldId="262"/>
+        </pc:sldMkLst>
+      </pc:sldChg>
+      <pc:sldChg chg="modSp mod">
+        <pc:chgData name="Simon RS" userId="8de322db93951f0c" providerId="LiveId" clId="{73DE76B5-7189-478F-BA36-61568D6537D4}" dt="2023-03-06T19:43:22.106" v="333" actId="20577"/>
+        <pc:sldMkLst>
+          <pc:docMk/>
+          <pc:sldMk cId="125310808" sldId="299"/>
+        </pc:sldMkLst>
+        <pc:spChg chg="mod">
+          <ac:chgData name="Simon RS" userId="8de322db93951f0c" providerId="LiveId" clId="{73DE76B5-7189-478F-BA36-61568D6537D4}" dt="2023-03-06T19:43:13.195" v="319" actId="20577"/>
+          <ac:spMkLst>
+            <pc:docMk/>
+            <pc:sldMk cId="125310808" sldId="299"/>
+            <ac:spMk id="12" creationId="{29510C85-6BE5-4729-88A4-7065984A7E1C}"/>
+          </ac:spMkLst>
+        </pc:spChg>
+        <pc:spChg chg="mod">
+          <ac:chgData name="Simon RS" userId="8de322db93951f0c" providerId="LiveId" clId="{73DE76B5-7189-478F-BA36-61568D6537D4}" dt="2023-03-06T19:43:22.106" v="333" actId="20577"/>
+          <ac:spMkLst>
+            <pc:docMk/>
+            <pc:sldMk cId="125310808" sldId="299"/>
+            <ac:spMk id="14" creationId="{3C1D5955-8254-7F04-1CFD-F79A8CC23B5C}"/>
+          </ac:spMkLst>
+        </pc:spChg>
+        <pc:spChg chg="mod">
+          <ac:chgData name="Simon RS" userId="8de322db93951f0c" providerId="LiveId" clId="{73DE76B5-7189-478F-BA36-61568D6537D4}" dt="2023-03-06T18:41:00.175" v="84" actId="20577"/>
+          <ac:spMkLst>
+            <pc:docMk/>
+            <pc:sldMk cId="125310808" sldId="299"/>
+            <ac:spMk id="15" creationId="{BFFB8893-1FDE-8206-09E9-471E1FBD3BA7}"/>
+          </ac:spMkLst>
+        </pc:spChg>
+        <pc:spChg chg="mod">
+          <ac:chgData name="Simon RS" userId="8de322db93951f0c" providerId="LiveId" clId="{73DE76B5-7189-478F-BA36-61568D6537D4}" dt="2023-03-06T18:40:58.196" v="83" actId="20577"/>
+          <ac:spMkLst>
+            <pc:docMk/>
+            <pc:sldMk cId="125310808" sldId="299"/>
+            <ac:spMk id="16" creationId="{D5377B04-D7B1-2B1B-C46B-7E979B1E4E8E}"/>
+          </ac:spMkLst>
+        </pc:spChg>
+      </pc:sldChg>
+      <pc:sldChg chg="delSp mod">
+        <pc:chgData name="Simon RS" userId="8de322db93951f0c" providerId="LiveId" clId="{73DE76B5-7189-478F-BA36-61568D6537D4}" dt="2023-03-06T18:57:35.019" v="197" actId="478"/>
+        <pc:sldMkLst>
+          <pc:docMk/>
+          <pc:sldMk cId="1960744019" sldId="309"/>
+        </pc:sldMkLst>
+        <pc:spChg chg="del">
+          <ac:chgData name="Simon RS" userId="8de322db93951f0c" providerId="LiveId" clId="{73DE76B5-7189-478F-BA36-61568D6537D4}" dt="2023-03-06T18:57:34.457" v="196" actId="478"/>
+          <ac:spMkLst>
+            <pc:docMk/>
+            <pc:sldMk cId="1960744019" sldId="309"/>
+            <ac:spMk id="13" creationId="{FA490B3C-3338-3D04-17CB-42912706CE74}"/>
+          </ac:spMkLst>
+        </pc:spChg>
+        <pc:picChg chg="del">
+          <ac:chgData name="Simon RS" userId="8de322db93951f0c" providerId="LiveId" clId="{73DE76B5-7189-478F-BA36-61568D6537D4}" dt="2023-03-06T18:57:35.019" v="197" actId="478"/>
+          <ac:picMkLst>
+            <pc:docMk/>
+            <pc:sldMk cId="1960744019" sldId="309"/>
+            <ac:picMk id="4" creationId="{2C354C7D-F027-BE82-4E1A-621F43B035B6}"/>
+          </ac:picMkLst>
+        </pc:picChg>
+      </pc:sldChg>
+      <pc:sldChg chg="addSp delSp modSp mod modClrScheme chgLayout">
+        <pc:chgData name="Simon RS" userId="8de322db93951f0c" providerId="LiveId" clId="{73DE76B5-7189-478F-BA36-61568D6537D4}" dt="2023-03-06T19:11:31.292" v="224" actId="1076"/>
+        <pc:sldMkLst>
+          <pc:docMk/>
+          <pc:sldMk cId="40216774" sldId="310"/>
+        </pc:sldMkLst>
+        <pc:spChg chg="add del mod ord">
+          <ac:chgData name="Simon RS" userId="8de322db93951f0c" providerId="LiveId" clId="{73DE76B5-7189-478F-BA36-61568D6537D4}" dt="2023-03-06T18:59:44.118" v="200" actId="478"/>
+          <ac:spMkLst>
+            <pc:docMk/>
+            <pc:sldMk cId="40216774" sldId="310"/>
+            <ac:spMk id="2" creationId="{006A60F5-5B76-68F1-9E7F-AD8653405E54}"/>
+          </ac:spMkLst>
+        </pc:spChg>
+        <pc:spChg chg="add del mod ord">
+          <ac:chgData name="Simon RS" userId="8de322db93951f0c" providerId="LiveId" clId="{73DE76B5-7189-478F-BA36-61568D6537D4}" dt="2023-03-06T19:11:26.367" v="221" actId="478"/>
+          <ac:spMkLst>
+            <pc:docMk/>
+            <pc:sldMk cId="40216774" sldId="310"/>
+            <ac:spMk id="3" creationId="{1140AB01-8618-006C-67B8-9C201D9BA7A6}"/>
+          </ac:spMkLst>
+        </pc:spChg>
+        <pc:picChg chg="add mod">
+          <ac:chgData name="Simon RS" userId="8de322db93951f0c" providerId="LiveId" clId="{73DE76B5-7189-478F-BA36-61568D6537D4}" dt="2023-03-06T19:11:31.292" v="224" actId="1076"/>
+          <ac:picMkLst>
+            <pc:docMk/>
+            <pc:sldMk cId="40216774" sldId="310"/>
+            <ac:picMk id="5" creationId="{4B999E68-B701-3B15-4D8F-F6E0F2F05607}"/>
+          </ac:picMkLst>
+        </pc:picChg>
+      </pc:sldChg>
+      <pc:sldChg chg="addSp delSp modSp add mod chgLayout">
+        <pc:chgData name="Simon RS" userId="8de322db93951f0c" providerId="LiveId" clId="{73DE76B5-7189-478F-BA36-61568D6537D4}" dt="2023-03-06T18:57:21.924" v="195" actId="20577"/>
+        <pc:sldMkLst>
+          <pc:docMk/>
+          <pc:sldMk cId="3791297270" sldId="312"/>
+        </pc:sldMkLst>
+        <pc:spChg chg="del">
+          <ac:chgData name="Simon RS" userId="8de322db93951f0c" providerId="LiveId" clId="{73DE76B5-7189-478F-BA36-61568D6537D4}" dt="2023-03-06T18:55:32.431" v="86" actId="478"/>
+          <ac:spMkLst>
+            <pc:docMk/>
+            <pc:sldMk cId="3791297270" sldId="312"/>
+            <ac:spMk id="3" creationId="{4B1C1C98-59EB-01CD-54C5-504491D619B6}"/>
+          </ac:spMkLst>
+        </pc:spChg>
+        <pc:spChg chg="add del mod">
+          <ac:chgData name="Simon RS" userId="8de322db93951f0c" providerId="LiveId" clId="{73DE76B5-7189-478F-BA36-61568D6537D4}" dt="2023-03-06T18:55:39.582" v="87" actId="700"/>
+          <ac:spMkLst>
+            <pc:docMk/>
+            <pc:sldMk cId="3791297270" sldId="312"/>
+            <ac:spMk id="4" creationId="{8A387861-FCAE-889A-1C04-74241B6311BE}"/>
+          </ac:spMkLst>
+        </pc:spChg>
+        <pc:spChg chg="add mod ord">
+          <ac:chgData name="Simon RS" userId="8de322db93951f0c" providerId="LiveId" clId="{73DE76B5-7189-478F-BA36-61568D6537D4}" dt="2023-03-06T18:56:29.323" v="118" actId="700"/>
+          <ac:spMkLst>
+            <pc:docMk/>
+            <pc:sldMk cId="3791297270" sldId="312"/>
+            <ac:spMk id="5" creationId="{6FE5305F-0837-B9B9-13F7-763F41C8F0AA}"/>
+          </ac:spMkLst>
+        </pc:spChg>
+        <pc:spChg chg="add del mod ord">
+          <ac:chgData name="Simon RS" userId="8de322db93951f0c" providerId="LiveId" clId="{73DE76B5-7189-478F-BA36-61568D6537D4}" dt="2023-03-06T18:56:25.131" v="116" actId="478"/>
+          <ac:spMkLst>
+            <pc:docMk/>
+            <pc:sldMk cId="3791297270" sldId="312"/>
+            <ac:spMk id="6" creationId="{977909C1-B6D1-CF43-54D2-5FD34EDDC6B9}"/>
+          </ac:spMkLst>
+        </pc:spChg>
+        <pc:spChg chg="add del mod">
+          <ac:chgData name="Simon RS" userId="8de322db93951f0c" providerId="LiveId" clId="{73DE76B5-7189-478F-BA36-61568D6537D4}" dt="2023-03-06T18:56:27.168" v="117" actId="478"/>
+          <ac:spMkLst>
+            <pc:docMk/>
+            <pc:sldMk cId="3791297270" sldId="312"/>
+            <ac:spMk id="8" creationId="{2FE443F4-96FA-C904-0427-24B9B0686860}"/>
+          </ac:spMkLst>
+        </pc:spChg>
+        <pc:spChg chg="add mod ord">
+          <ac:chgData name="Simon RS" userId="8de322db93951f0c" providerId="LiveId" clId="{73DE76B5-7189-478F-BA36-61568D6537D4}" dt="2023-03-06T18:57:21.924" v="195" actId="20577"/>
+          <ac:spMkLst>
+            <pc:docMk/>
+            <pc:sldMk cId="3791297270" sldId="312"/>
+            <ac:spMk id="9" creationId="{759AE55B-CDAA-13E7-8EFD-D195FF6B3C4F}"/>
+          </ac:spMkLst>
+        </pc:spChg>
+      </pc:sldChg>
+      <pc:sldChg chg="modSp new mod">
+        <pc:chgData name="Simon RS" userId="8de322db93951f0c" providerId="LiveId" clId="{73DE76B5-7189-478F-BA36-61568D6537D4}" dt="2023-03-06T19:46:21.184" v="335" actId="20577"/>
+        <pc:sldMkLst>
+          <pc:docMk/>
+          <pc:sldMk cId="126644090" sldId="313"/>
+        </pc:sldMkLst>
+        <pc:spChg chg="mod">
+          <ac:chgData name="Simon RS" userId="8de322db93951f0c" providerId="LiveId" clId="{73DE76B5-7189-478F-BA36-61568D6537D4}" dt="2023-03-06T19:13:11.370" v="246" actId="20577"/>
+          <ac:spMkLst>
+            <pc:docMk/>
+            <pc:sldMk cId="126644090" sldId="313"/>
+            <ac:spMk id="2" creationId="{32C4D41F-CCAC-2F4A-5904-2906362AAFEC}"/>
+          </ac:spMkLst>
+        </pc:spChg>
+        <pc:spChg chg="mod">
+          <ac:chgData name="Simon RS" userId="8de322db93951f0c" providerId="LiveId" clId="{73DE76B5-7189-478F-BA36-61568D6537D4}" dt="2023-03-06T19:46:21.184" v="335" actId="20577"/>
+          <ac:spMkLst>
+            <pc:docMk/>
+            <pc:sldMk cId="126644090" sldId="313"/>
+            <ac:spMk id="3" creationId="{BE5841EF-40C1-E095-0C14-E17FC583A943}"/>
+          </ac:spMkLst>
+        </pc:spChg>
+      </pc:sldChg>
+    </pc:docChg>
+  </pc:docChgLst>
+  <pc:docChgLst>
     <pc:chgData name="Simon Rausch-Schott" userId="8de322db93951f0c" providerId="LiveId" clId="{D2B5FCF1-0D36-4422-BED8-A84B5C70DBF4}"/>
     <pc:docChg chg="custSel modSld">
       <pc:chgData name="Simon Rausch-Schott" userId="8de322db93951f0c" providerId="LiveId" clId="{D2B5FCF1-0D36-4422-BED8-A84B5C70DBF4}" dt="2023-01-26T18:18:29.648" v="31" actId="403"/>
@@ -1188,110 +1375,6 @@
     </a:lvl9pPr>
   </p:notesStyle>
 </p:notesMaster>
-</file>
-
-<file path=ppt/notesSlides/notesSlide1.xml><?xml version="1.0" encoding="utf-8"?>
-<p:notes xmlns:a="http://schemas.openxmlformats.org/drawingml/2006/main" xmlns:r="http://schemas.openxmlformats.org/officeDocument/2006/relationships" xmlns:p="http://schemas.openxmlformats.org/presentationml/2006/main" showMasterSp="0" showMasterPhAnim="0">
-  <p:cSld>
-    <p:spTree>
-      <p:nvGrpSpPr>
-        <p:cNvPr id="1" name="Shape 1062"/>
-        <p:cNvGrpSpPr/>
-        <p:nvPr/>
-      </p:nvGrpSpPr>
-      <p:grpSpPr>
-        <a:xfrm>
-          <a:off x="0" y="0"/>
-          <a:ext cx="0" cy="0"/>
-          <a:chOff x="0" y="0"/>
-          <a:chExt cx="0" cy="0"/>
-        </a:xfrm>
-      </p:grpSpPr>
-      <p:sp>
-        <p:nvSpPr>
-          <p:cNvPr id="1063" name="Google Shape;1063;g91d5970ff1_0_117:notes"/>
-          <p:cNvSpPr>
-            <a:spLocks noGrp="1" noRot="1" noChangeAspect="1"/>
-          </p:cNvSpPr>
-          <p:nvPr>
-            <p:ph type="sldImg" idx="2"/>
-          </p:nvPr>
-        </p:nvSpPr>
-        <p:spPr>
-          <a:xfrm>
-            <a:off x="381000" y="685800"/>
-            <a:ext cx="6096000" cy="3429000"/>
-          </a:xfrm>
-          <a:custGeom>
-            <a:avLst/>
-            <a:gdLst/>
-            <a:ahLst/>
-            <a:cxnLst/>
-            <a:rect l="l" t="t" r="r" b="b"/>
-            <a:pathLst>
-              <a:path w="120000" h="120000" extrusionOk="0">
-                <a:moveTo>
-                  <a:pt x="0" y="0"/>
-                </a:moveTo>
-                <a:lnTo>
-                  <a:pt x="120000" y="0"/>
-                </a:lnTo>
-                <a:lnTo>
-                  <a:pt x="120000" y="120000"/>
-                </a:lnTo>
-                <a:lnTo>
-                  <a:pt x="0" y="120000"/>
-                </a:lnTo>
-                <a:close/>
-              </a:path>
-            </a:pathLst>
-          </a:custGeom>
-        </p:spPr>
-      </p:sp>
-      <p:sp>
-        <p:nvSpPr>
-          <p:cNvPr id="1064" name="Google Shape;1064;g91d5970ff1_0_117:notes"/>
-          <p:cNvSpPr txBox="1">
-            <a:spLocks noGrp="1"/>
-          </p:cNvSpPr>
-          <p:nvPr>
-            <p:ph type="body" idx="1"/>
-          </p:nvPr>
-        </p:nvSpPr>
-        <p:spPr>
-          <a:xfrm>
-            <a:off x="685800" y="4343400"/>
-            <a:ext cx="5486400" cy="4114800"/>
-          </a:xfrm>
-          <a:prstGeom prst="rect">
-            <a:avLst/>
-          </a:prstGeom>
-        </p:spPr>
-        <p:txBody>
-          <a:bodyPr spcFirstLastPara="1" wrap="square" lIns="91425" tIns="91425" rIns="91425" bIns="91425" anchor="t" anchorCtr="0">
-            <a:noAutofit/>
-          </a:bodyPr>
-          <a:lstStyle/>
-          <a:p>
-            <a:pPr marL="0" lvl="0" indent="0" algn="l" rtl="0">
-              <a:spcBef>
-                <a:spcPts val="0"/>
-              </a:spcBef>
-              <a:spcAft>
-                <a:spcPts val="0"/>
-              </a:spcAft>
-              <a:buNone/>
-            </a:pPr>
-            <a:endParaRPr dirty="0"/>
-          </a:p>
-        </p:txBody>
-      </p:sp>
-    </p:spTree>
-  </p:cSld>
-  <p:clrMapOvr>
-    <a:masterClrMapping/>
-  </p:clrMapOvr>
-</p:notes>
 </file>
 
 <file path=ppt/slideLayouts/slideLayout1.xml><?xml version="1.0" encoding="utf-8"?>
@@ -6619,7 +6702,7 @@
         <p:spPr>
           <a:xfrm>
             <a:off x="571497" y="3765176"/>
-            <a:ext cx="1748119" cy="1077218"/>
+            <a:ext cx="1748119" cy="1292662"/>
           </a:xfrm>
           <a:prstGeom prst="rect">
             <a:avLst/>
@@ -6662,18 +6745,27 @@
           </a:p>
           <a:p>
             <a:pPr algn="ctr"/>
+            <a:endParaRPr lang="de-AT" dirty="0">
+              <a:latin typeface="Fira Sans" panose="020B0503050000020004" pitchFamily="34" charset="0"/>
+            </a:endParaRPr>
+          </a:p>
+          <a:p>
+            <a:pPr algn="ctr"/>
             <a:r>
               <a:rPr lang="de-AT" dirty="0">
                 <a:latin typeface="Fira Sans" panose="020B0503050000020004" pitchFamily="34" charset="0"/>
               </a:rPr>
-              <a:t>….</a:t>
+              <a:t>Content/</a:t>
             </a:r>
           </a:p>
           <a:p>
             <a:pPr algn="ctr"/>
-            <a:endParaRPr lang="de-AT" dirty="0">
-              <a:latin typeface="Fira Sans" panose="020B0503050000020004" pitchFamily="34" charset="0"/>
-            </a:endParaRPr>
+            <a:r>
+              <a:rPr lang="de-AT" dirty="0">
+                <a:latin typeface="Fira Sans" panose="020B0503050000020004" pitchFamily="34" charset="0"/>
+              </a:rPr>
+              <a:t>Networking</a:t>
+            </a:r>
           </a:p>
         </p:txBody>
       </p:sp>
@@ -6692,7 +6784,7 @@
         <p:spPr>
           <a:xfrm>
             <a:off x="2662517" y="3765176"/>
-            <a:ext cx="1748118" cy="1077218"/>
+            <a:ext cx="1748118" cy="1292662"/>
           </a:xfrm>
           <a:prstGeom prst="rect">
             <a:avLst/>
@@ -6729,18 +6821,27 @@
           </a:p>
           <a:p>
             <a:pPr algn="ctr"/>
+            <a:endParaRPr lang="de-AT" dirty="0">
+              <a:latin typeface="Fira Sans" panose="020B0503050000020004" pitchFamily="34" charset="0"/>
+            </a:endParaRPr>
+          </a:p>
+          <a:p>
+            <a:pPr algn="ctr"/>
             <a:r>
               <a:rPr lang="de-AT" dirty="0">
                 <a:latin typeface="Fira Sans" panose="020B0503050000020004" pitchFamily="34" charset="0"/>
               </a:rPr>
-              <a:t>….</a:t>
+              <a:t>Teamleitung/</a:t>
             </a:r>
           </a:p>
           <a:p>
             <a:pPr algn="ctr"/>
-            <a:endParaRPr lang="de-AT" dirty="0">
-              <a:latin typeface="Fira Sans" panose="020B0503050000020004" pitchFamily="34" charset="0"/>
-            </a:endParaRPr>
+            <a:r>
+              <a:rPr lang="de-AT" dirty="0">
+                <a:latin typeface="Fira Sans" panose="020B0503050000020004" pitchFamily="34" charset="0"/>
+              </a:rPr>
+              <a:t>Organisation</a:t>
+            </a:r>
           </a:p>
         </p:txBody>
       </p:sp>
@@ -6759,7 +6860,7 @@
         <p:spPr>
           <a:xfrm>
             <a:off x="4753535" y="3769658"/>
-            <a:ext cx="1748118" cy="1077218"/>
+            <a:ext cx="1748118" cy="1292662"/>
           </a:xfrm>
           <a:prstGeom prst="rect">
             <a:avLst/>
@@ -6796,15 +6897,33 @@
           </a:p>
           <a:p>
             <a:pPr algn="ctr"/>
+            <a:endParaRPr lang="de-AT" dirty="0">
+              <a:latin typeface="Fira Sans" panose="020B0503050000020004" pitchFamily="34" charset="0"/>
+            </a:endParaRPr>
+          </a:p>
+          <a:p>
+            <a:pPr algn="ctr"/>
             <a:r>
               <a:rPr lang="de-AT" dirty="0">
                 <a:latin typeface="Fira Sans" panose="020B0503050000020004" pitchFamily="34" charset="0"/>
               </a:rPr>
-              <a:t>….</a:t>
+              <a:t>Content/</a:t>
             </a:r>
           </a:p>
           <a:p>
             <a:pPr algn="ctr"/>
+            <a:r>
+              <a:rPr lang="de-AT" dirty="0">
+                <a:latin typeface="Fira Sans" panose="020B0503050000020004" pitchFamily="34" charset="0"/>
+              </a:rPr>
+              <a:t>Home </a:t>
+            </a:r>
+            <a:r>
+              <a:rPr lang="de-AT" dirty="0" err="1">
+                <a:latin typeface="Fira Sans" panose="020B0503050000020004" pitchFamily="34" charset="0"/>
+              </a:rPr>
+              <a:t>Assistant</a:t>
+            </a:r>
             <a:endParaRPr lang="de-AT" dirty="0">
               <a:latin typeface="Fira Sans" panose="020B0503050000020004" pitchFamily="34" charset="0"/>
             </a:endParaRPr>
@@ -6826,7 +6945,7 @@
         <p:spPr>
           <a:xfrm>
             <a:off x="6844553" y="3765176"/>
-            <a:ext cx="1748118" cy="1077218"/>
+            <a:ext cx="1748118" cy="1292662"/>
           </a:xfrm>
           <a:prstGeom prst="rect">
             <a:avLst/>
@@ -6863,15 +6982,33 @@
           </a:p>
           <a:p>
             <a:pPr algn="ctr"/>
+            <a:endParaRPr lang="de-AT" dirty="0">
+              <a:latin typeface="Fira Sans" panose="020B0503050000020004" pitchFamily="34" charset="0"/>
+            </a:endParaRPr>
+          </a:p>
+          <a:p>
+            <a:pPr algn="ctr"/>
             <a:r>
               <a:rPr lang="de-AT" dirty="0">
                 <a:latin typeface="Fira Sans" panose="020B0503050000020004" pitchFamily="34" charset="0"/>
               </a:rPr>
-              <a:t>….</a:t>
+              <a:t>Content/</a:t>
             </a:r>
           </a:p>
           <a:p>
             <a:pPr algn="ctr"/>
+            <a:r>
+              <a:rPr lang="de-AT" dirty="0">
+                <a:latin typeface="Fira Sans" panose="020B0503050000020004" pitchFamily="34" charset="0"/>
+              </a:rPr>
+              <a:t>Home </a:t>
+            </a:r>
+            <a:r>
+              <a:rPr lang="de-AT" dirty="0" err="1">
+                <a:latin typeface="Fira Sans" panose="020B0503050000020004" pitchFamily="34" charset="0"/>
+              </a:rPr>
+              <a:t>Assistant</a:t>
+            </a:r>
             <a:endParaRPr lang="de-AT" dirty="0">
               <a:latin typeface="Fira Sans" panose="020B0503050000020004" pitchFamily="34" charset="0"/>
             </a:endParaRPr>
@@ -7029,6 +7166,104 @@
       </p:grpSpPr>
       <p:sp>
         <p:nvSpPr>
+          <p:cNvPr id="5" name="Titel 4">
+            <a:extLst>
+              <a:ext uri="{FF2B5EF4-FFF2-40B4-BE49-F238E27FC236}">
+                <a16:creationId xmlns:a16="http://schemas.microsoft.com/office/drawing/2014/main" id="{6FE5305F-0837-B9B9-13F7-763F41C8F0AA}"/>
+              </a:ext>
+            </a:extLst>
+          </p:cNvPr>
+          <p:cNvSpPr>
+            <a:spLocks noGrp="1"/>
+          </p:cNvSpPr>
+          <p:nvPr>
+            <p:ph type="title"/>
+          </p:nvPr>
+        </p:nvSpPr>
+        <p:spPr/>
+        <p:txBody>
+          <a:bodyPr/>
+          <a:lstStyle/>
+          <a:p>
+            <a:r>
+              <a:rPr lang="de-AT" dirty="0"/>
+              <a:t>Motivation</a:t>
+            </a:r>
+          </a:p>
+        </p:txBody>
+      </p:sp>
+      <p:sp>
+        <p:nvSpPr>
+          <p:cNvPr id="9" name="Textplatzhalter 8">
+            <a:extLst>
+              <a:ext uri="{FF2B5EF4-FFF2-40B4-BE49-F238E27FC236}">
+                <a16:creationId xmlns:a16="http://schemas.microsoft.com/office/drawing/2014/main" id="{759AE55B-CDAA-13E7-8EFD-D195FF6B3C4F}"/>
+              </a:ext>
+            </a:extLst>
+          </p:cNvPr>
+          <p:cNvSpPr>
+            <a:spLocks noGrp="1"/>
+          </p:cNvSpPr>
+          <p:nvPr>
+            <p:ph type="body" idx="1"/>
+          </p:nvPr>
+        </p:nvSpPr>
+        <p:spPr/>
+        <p:txBody>
+          <a:bodyPr/>
+          <a:lstStyle/>
+          <a:p>
+            <a:r>
+              <a:rPr lang="de-AT" dirty="0"/>
+              <a:t>Warum?</a:t>
+            </a:r>
+          </a:p>
+          <a:p>
+            <a:r>
+              <a:rPr lang="de-AT" dirty="0"/>
+              <a:t>Grundidee?</a:t>
+            </a:r>
+          </a:p>
+          <a:p>
+            <a:r>
+              <a:rPr lang="de-AT" dirty="0"/>
+              <a:t>Aktuelle Lage wiederspiegeln?</a:t>
+            </a:r>
+          </a:p>
+        </p:txBody>
+      </p:sp>
+    </p:spTree>
+    <p:extLst>
+      <p:ext uri="{BB962C8B-B14F-4D97-AF65-F5344CB8AC3E}">
+        <p14:creationId xmlns:p14="http://schemas.microsoft.com/office/powerpoint/2010/main" val="3791297270"/>
+      </p:ext>
+    </p:extLst>
+  </p:cSld>
+  <p:clrMapOvr>
+    <a:masterClrMapping/>
+  </p:clrMapOvr>
+</p:sld>
+</file>
+
+<file path=ppt/slides/slide4.xml><?xml version="1.0" encoding="utf-8"?>
+<p:sld xmlns:a="http://schemas.openxmlformats.org/drawingml/2006/main" xmlns:r="http://schemas.openxmlformats.org/officeDocument/2006/relationships" xmlns:p="http://schemas.openxmlformats.org/presentationml/2006/main">
+  <p:cSld>
+    <p:spTree>
+      <p:nvGrpSpPr>
+        <p:cNvPr id="1" name=""/>
+        <p:cNvGrpSpPr/>
+        <p:nvPr/>
+      </p:nvGrpSpPr>
+      <p:grpSpPr>
+        <a:xfrm>
+          <a:off x="0" y="0"/>
+          <a:ext cx="0" cy="0"/>
+          <a:chOff x="0" y="0"/>
+          <a:chExt cx="0" cy="0"/>
+        </a:xfrm>
+      </p:grpSpPr>
+      <p:sp>
+        <p:nvSpPr>
           <p:cNvPr id="3" name="Textplatzhalter 2">
             <a:extLst>
               <a:ext uri="{FF2B5EF4-FFF2-40B4-BE49-F238E27FC236}">
@@ -7069,25 +7304,10 @@
                   </a:outerShdw>
                 </a:effectLst>
               </a:rPr>
-              <a:t>Umfrage unter </a:t>
+              <a:t>Umfrage unter ~</a:t>
             </a:r>
             <a:r>
-              <a:rPr lang="de-AT" sz="6000" b="1">
-                <a:solidFill>
-                  <a:schemeClr val="accent4"/>
-                </a:solidFill>
-                <a:effectLst>
-                  <a:outerShdw blurRad="38100" dist="38100" dir="2700000" algn="tl">
-                    <a:srgbClr val="000000">
-                      <a:alpha val="43137"/>
-                    </a:srgbClr>
-                  </a:outerShdw>
-                </a:effectLst>
-              </a:rPr>
-              <a:t>~</a:t>
-            </a:r>
-            <a:r>
-              <a:rPr lang="de-AT" sz="6000" b="1" u="sng">
+              <a:rPr lang="de-AT" sz="6000" b="1" u="sng" dirty="0">
                 <a:solidFill>
                   <a:schemeClr val="accent4"/>
                 </a:solidFill>
@@ -7144,7 +7364,7 @@
 </p:sld>
 </file>
 
-<file path=ppt/slides/slide4.xml><?xml version="1.0" encoding="utf-8"?>
+<file path=ppt/slides/slide5.xml><?xml version="1.0" encoding="utf-8"?>
 <p:sld xmlns:a="http://schemas.openxmlformats.org/drawingml/2006/main" xmlns:r="http://schemas.openxmlformats.org/officeDocument/2006/relationships" xmlns:p="http://schemas.openxmlformats.org/presentationml/2006/main">
   <p:cSld>
     <p:spTree>
@@ -7189,51 +7409,6 @@
           </a:p>
         </p:txBody>
       </p:sp>
-      <p:pic>
-        <p:nvPicPr>
-          <p:cNvPr id="4" name="Picture 2">
-            <a:extLst>
-              <a:ext uri="{FF2B5EF4-FFF2-40B4-BE49-F238E27FC236}">
-                <a16:creationId xmlns:a16="http://schemas.microsoft.com/office/drawing/2014/main" id="{2C354C7D-F027-BE82-4E1A-621F43B035B6}"/>
-              </a:ext>
-            </a:extLst>
-          </p:cNvPr>
-          <p:cNvPicPr>
-            <a:picLocks noChangeAspect="1" noChangeArrowheads="1"/>
-          </p:cNvPicPr>
-          <p:nvPr/>
-        </p:nvPicPr>
-        <p:blipFill rotWithShape="1">
-          <a:blip r:embed="rId2">
-            <a:extLst>
-              <a:ext uri="{28A0092B-C50C-407E-A947-70E740481C1C}">
-                <a14:useLocalDpi xmlns:a14="http://schemas.microsoft.com/office/drawing/2010/main" val="0"/>
-              </a:ext>
-            </a:extLst>
-          </a:blip>
-          <a:srcRect r="80302"/>
-          <a:stretch/>
-        </p:blipFill>
-        <p:spPr bwMode="auto">
-          <a:xfrm>
-            <a:off x="7282543" y="210503"/>
-            <a:ext cx="1549757" cy="1575879"/>
-          </a:xfrm>
-          <a:prstGeom prst="rect">
-            <a:avLst/>
-          </a:prstGeom>
-          <a:noFill/>
-          <a:extLst>
-            <a:ext uri="{909E8E84-426E-40DD-AFC4-6F175D3DCCD1}">
-              <a14:hiddenFill xmlns:a14="http://schemas.microsoft.com/office/drawing/2010/main">
-                <a:solidFill>
-                  <a:srgbClr val="FFFFFF"/>
-                </a:solidFill>
-              </a14:hiddenFill>
-            </a:ext>
-          </a:extLst>
-        </p:spPr>
-      </p:pic>
       <p:sp>
         <p:nvSpPr>
           <p:cNvPr id="6" name="Sprechblase: rechteckig 5">
@@ -7530,47 +7705,6 @@
                 <a:latin typeface="Fira Sans" panose="020B0503050000020004" pitchFamily="34" charset="0"/>
               </a:rPr>
               <a:t>Wie möchtest du in Zukunft wohnen?</a:t>
-            </a:r>
-          </a:p>
-        </p:txBody>
-      </p:sp>
-      <p:sp>
-        <p:nvSpPr>
-          <p:cNvPr id="13" name="Textfeld 12">
-            <a:extLst>
-              <a:ext uri="{FF2B5EF4-FFF2-40B4-BE49-F238E27FC236}">
-                <a16:creationId xmlns:a16="http://schemas.microsoft.com/office/drawing/2014/main" id="{FA490B3C-3338-3D04-17CB-42912706CE74}"/>
-              </a:ext>
-            </a:extLst>
-          </p:cNvPr>
-          <p:cNvSpPr txBox="1"/>
-          <p:nvPr/>
-        </p:nvSpPr>
-        <p:spPr>
-          <a:xfrm>
-            <a:off x="7609114" y="1707341"/>
-            <a:ext cx="1410789" cy="246221"/>
-          </a:xfrm>
-          <a:prstGeom prst="rect">
-            <a:avLst/>
-          </a:prstGeom>
-          <a:noFill/>
-        </p:spPr>
-        <p:txBody>
-          <a:bodyPr wrap="square" rtlCol="0">
-            <a:spAutoFit/>
-          </a:bodyPr>
-          <a:lstStyle/>
-          <a:p>
-            <a:r>
-              <a:rPr lang="de-AT" sz="1000" dirty="0">
-                <a:solidFill>
-                  <a:schemeClr val="bg2">
-                    <a:lumMod val="50000"/>
-                  </a:schemeClr>
-                </a:solidFill>
-              </a:rPr>
-              <a:t>Zur Umfrage</a:t>
             </a:r>
           </a:p>
         </p:txBody>
@@ -7890,7 +8024,7 @@
 </p:sld>
 </file>
 
-<file path=ppt/slides/slide5.xml><?xml version="1.0" encoding="utf-8"?>
+<file path=ppt/slides/slide6.xml><?xml version="1.0" encoding="utf-8"?>
 <p:sld xmlns:a="http://schemas.openxmlformats.org/drawingml/2006/main" xmlns:r="http://schemas.openxmlformats.org/officeDocument/2006/relationships" xmlns:p="http://schemas.openxmlformats.org/presentationml/2006/main">
   <p:cSld>
     <p:spTree>
@@ -8237,7 +8371,7 @@
 </p:sld>
 </file>
 
-<file path=ppt/slides/slide6.xml><?xml version="1.0" encoding="utf-8"?>
+<file path=ppt/slides/slide7.xml><?xml version="1.0" encoding="utf-8"?>
 <p:sld xmlns:a="http://schemas.openxmlformats.org/drawingml/2006/main" xmlns:r="http://schemas.openxmlformats.org/officeDocument/2006/relationships" xmlns:p="http://schemas.openxmlformats.org/presentationml/2006/main">
   <p:cSld>
     <p:spTree>
@@ -8541,6 +8675,36 @@
           </a:p>
         </p:txBody>
       </p:sp>
+      <p:pic>
+        <p:nvPicPr>
+          <p:cNvPr id="5" name="Grafik 4">
+            <a:extLst>
+              <a:ext uri="{FF2B5EF4-FFF2-40B4-BE49-F238E27FC236}">
+                <a16:creationId xmlns:a16="http://schemas.microsoft.com/office/drawing/2014/main" id="{4B999E68-B701-3B15-4D8F-F6E0F2F05607}"/>
+              </a:ext>
+            </a:extLst>
+          </p:cNvPr>
+          <p:cNvPicPr>
+            <a:picLocks noChangeAspect="1"/>
+          </p:cNvPicPr>
+          <p:nvPr/>
+        </p:nvPicPr>
+        <p:blipFill>
+          <a:blip r:embed="rId2"/>
+          <a:stretch>
+            <a:fillRect/>
+          </a:stretch>
+        </p:blipFill>
+        <p:spPr>
+          <a:xfrm>
+            <a:off x="446730" y="1017725"/>
+            <a:ext cx="8250540" cy="3908151"/>
+          </a:xfrm>
+          <a:prstGeom prst="rect">
+            <a:avLst/>
+          </a:prstGeom>
+        </p:spPr>
+      </p:pic>
     </p:spTree>
     <p:extLst>
       <p:ext uri="{BB962C8B-B14F-4D97-AF65-F5344CB8AC3E}">
@@ -8554,12 +8718,12 @@
 </p:sld>
 </file>
 
-<file path=ppt/slides/slide7.xml><?xml version="1.0" encoding="utf-8"?>
+<file path=ppt/slides/slide8.xml><?xml version="1.0" encoding="utf-8"?>
 <p:sld xmlns:a="http://schemas.openxmlformats.org/drawingml/2006/main" xmlns:r="http://schemas.openxmlformats.org/officeDocument/2006/relationships" xmlns:p="http://schemas.openxmlformats.org/presentationml/2006/main">
   <p:cSld>
     <p:spTree>
       <p:nvGrpSpPr>
-        <p:cNvPr id="1" name="Shape 1065"/>
+        <p:cNvPr id="1" name=""/>
         <p:cNvGrpSpPr/>
         <p:nvPr/>
       </p:nvGrpSpPr>
@@ -8573,87 +8737,77 @@
       </p:grpSpPr>
       <p:sp>
         <p:nvSpPr>
-          <p:cNvPr id="1066" name="Google Shape;1066;p21"/>
-          <p:cNvSpPr txBox="1"/>
-          <p:nvPr/>
+          <p:cNvPr id="2" name="Titel 1">
+            <a:extLst>
+              <a:ext uri="{FF2B5EF4-FFF2-40B4-BE49-F238E27FC236}">
+                <a16:creationId xmlns:a16="http://schemas.microsoft.com/office/drawing/2014/main" id="{32C4D41F-CCAC-2F4A-5904-2906362AAFEC}"/>
+              </a:ext>
+            </a:extLst>
+          </p:cNvPr>
+          <p:cNvSpPr>
+            <a:spLocks noGrp="1"/>
+          </p:cNvSpPr>
+          <p:nvPr>
+            <p:ph type="title"/>
+          </p:nvPr>
         </p:nvSpPr>
-        <p:spPr>
-          <a:xfrm>
-            <a:off x="515326" y="215986"/>
-            <a:ext cx="8520600" cy="697360"/>
-          </a:xfrm>
-          <a:prstGeom prst="rect">
-            <a:avLst/>
-          </a:prstGeom>
-          <a:noFill/>
-          <a:ln>
-            <a:noFill/>
-          </a:ln>
-        </p:spPr>
+        <p:spPr/>
         <p:txBody>
-          <a:bodyPr spcFirstLastPara="1" wrap="square" lIns="91425" tIns="91425" rIns="91425" bIns="91425" anchor="t" anchorCtr="0">
-            <a:noAutofit/>
-          </a:bodyPr>
+          <a:bodyPr/>
           <a:lstStyle/>
           <a:p>
-            <a:pPr marL="0" lvl="0" indent="0" algn="ctr" rtl="0">
-              <a:lnSpc>
-                <a:spcPct val="115000"/>
-              </a:lnSpc>
-              <a:spcBef>
-                <a:spcPts val="0"/>
-              </a:spcBef>
-              <a:spcAft>
-                <a:spcPts val="1600"/>
-              </a:spcAft>
-              <a:buNone/>
-            </a:pPr>
             <a:r>
-              <a:rPr lang="de-DE" sz="4400" b="1" dirty="0">
-                <a:solidFill>
-                  <a:srgbClr val="FFC000"/>
-                </a:solidFill>
-                <a:latin typeface="Fira Sans"/>
-                <a:ea typeface="Fira Sans"/>
-                <a:cs typeface="Fira Sans"/>
-                <a:sym typeface="Fira Sans"/>
-              </a:rPr>
-              <a:t>JETZT ABSTIMMEN</a:t>
+              <a:rPr lang="de-AT" dirty="0"/>
+              <a:t>„Live“-Demo</a:t>
             </a:r>
           </a:p>
         </p:txBody>
       </p:sp>
-      <p:pic>
-        <p:nvPicPr>
-          <p:cNvPr id="4" name="Grafik 3">
+      <p:sp>
+        <p:nvSpPr>
+          <p:cNvPr id="3" name="Textplatzhalter 2">
             <a:extLst>
               <a:ext uri="{FF2B5EF4-FFF2-40B4-BE49-F238E27FC236}">
-                <a16:creationId xmlns:a16="http://schemas.microsoft.com/office/drawing/2014/main" id="{E8847A61-DF46-18EB-409F-460D3583B8AC}"/>
+                <a16:creationId xmlns:a16="http://schemas.microsoft.com/office/drawing/2014/main" id="{BE5841EF-40C1-E095-0C14-E17FC583A943}"/>
               </a:ext>
             </a:extLst>
           </p:cNvPr>
-          <p:cNvPicPr>
-            <a:picLocks noChangeAspect="1"/>
-          </p:cNvPicPr>
-          <p:nvPr/>
-        </p:nvPicPr>
-        <p:blipFill>
-          <a:blip r:embed="rId3"/>
-          <a:stretch>
-            <a:fillRect/>
-          </a:stretch>
-        </p:blipFill>
-        <p:spPr>
-          <a:xfrm>
-            <a:off x="2913208" y="961464"/>
-            <a:ext cx="3724835" cy="3724835"/>
-          </a:xfrm>
-          <a:prstGeom prst="rect">
-            <a:avLst/>
-          </a:prstGeom>
-        </p:spPr>
-      </p:pic>
+          <p:cNvSpPr>
+            <a:spLocks noGrp="1"/>
+          </p:cNvSpPr>
+          <p:nvPr>
+            <p:ph type="body" idx="1"/>
+          </p:nvPr>
+        </p:nvSpPr>
+        <p:spPr/>
+        <p:txBody>
+          <a:bodyPr/>
+          <a:lstStyle/>
+          <a:p>
+            <a:r>
+              <a:rPr lang="de-AT" dirty="0"/>
+              <a:t>Video aufnehmen?</a:t>
+            </a:r>
+          </a:p>
+          <a:p>
+            <a:r>
+              <a:rPr lang="de-AT" dirty="0"/>
+              <a:t>„Live</a:t>
+            </a:r>
+            <a:r>
+              <a:rPr lang="de-AT"/>
+              <a:t>“ herzeigen</a:t>
+            </a:r>
+            <a:endParaRPr lang="de-AT" dirty="0"/>
+          </a:p>
+        </p:txBody>
+      </p:sp>
     </p:spTree>
+    <p:extLst>
+      <p:ext uri="{BB962C8B-B14F-4D97-AF65-F5344CB8AC3E}">
+        <p14:creationId xmlns:p14="http://schemas.microsoft.com/office/powerpoint/2010/main" val="126644090"/>
+      </p:ext>
+    </p:extLst>
   </p:cSld>
   <p:clrMapOvr>
     <a:masterClrMapping/>
@@ -9224,6 +9378,12 @@
 </file>
 
 <file path=customXml/item1.xml><?xml version="1.0" encoding="utf-8"?>
+<p:properties xmlns:p="http://schemas.microsoft.com/office/2006/metadata/properties" xmlns:xsi="http://www.w3.org/2001/XMLSchema-instance" xmlns:pc="http://schemas.microsoft.com/office/infopath/2007/PartnerControls">
+  <documentManagement/>
+</p:properties>
+</file>
+
+<file path=customXml/item2.xml><?xml version="1.0" encoding="utf-8"?>
 <ct:contentTypeSchema xmlns:ct="http://schemas.microsoft.com/office/2006/metadata/contentType" xmlns:ma="http://schemas.microsoft.com/office/2006/metadata/properties/metaAttributes" ct:_="" ma:_="" ma:contentTypeName="Dokument" ma:contentTypeID="0x01010004D1E907EEEE2F44A9125CAEE7BD0D8B" ma:contentTypeVersion="11" ma:contentTypeDescription="Ein neues Dokument erstellen." ma:contentTypeScope="" ma:versionID="8ebbab096d02970790be8873c354fd4c">
   <xsd:schema xmlns:xsd="http://www.w3.org/2001/XMLSchema" xmlns:xs="http://www.w3.org/2001/XMLSchema" xmlns:p="http://schemas.microsoft.com/office/2006/metadata/properties" xmlns:ns3="7eb914d0-ee65-4b36-817b-6b50d787ca6f" xmlns:ns4="37f8ee66-e861-4fad-b6ec-7ec50ddbf115" targetNamespace="http://schemas.microsoft.com/office/2006/metadata/properties" ma:root="true" ma:fieldsID="234e57b5343d58c42a4e792a879f0f19" ns3:_="" ns4:_="">
     <xsd:import namespace="7eb914d0-ee65-4b36-817b-6b50d787ca6f"/>
@@ -9434,12 +9594,6 @@
 </ct:contentTypeSchema>
 </file>
 
-<file path=customXml/item2.xml><?xml version="1.0" encoding="utf-8"?>
-<p:properties xmlns:p="http://schemas.microsoft.com/office/2006/metadata/properties" xmlns:xsi="http://www.w3.org/2001/XMLSchema-instance" xmlns:pc="http://schemas.microsoft.com/office/infopath/2007/PartnerControls">
-  <documentManagement/>
-</p:properties>
-</file>
-
 <file path=customXml/item3.xml><?xml version="1.0" encoding="utf-8"?>
 <?mso-contentType ?>
 <FormTemplates xmlns="http://schemas.microsoft.com/sharepoint/v3/contenttype/forms">
@@ -9450,6 +9604,23 @@
 </file>
 
 <file path=customXml/itemProps1.xml><?xml version="1.0" encoding="utf-8"?>
+<ds:datastoreItem xmlns:ds="http://schemas.openxmlformats.org/officeDocument/2006/customXml" ds:itemID="{7FDF9755-4989-4011-A0C8-F73BCB73BCB3}">
+  <ds:schemaRefs>
+    <ds:schemaRef ds:uri="http://schemas.microsoft.com/office/2006/documentManagement/types"/>
+    <ds:schemaRef ds:uri="http://schemas.microsoft.com/office/infopath/2007/PartnerControls"/>
+    <ds:schemaRef ds:uri="http://purl.org/dc/elements/1.1/"/>
+    <ds:schemaRef ds:uri="http://schemas.microsoft.com/office/2006/metadata/properties"/>
+    <ds:schemaRef ds:uri="7eb914d0-ee65-4b36-817b-6b50d787ca6f"/>
+    <ds:schemaRef ds:uri="http://purl.org/dc/terms/"/>
+    <ds:schemaRef ds:uri="http://schemas.openxmlformats.org/package/2006/metadata/core-properties"/>
+    <ds:schemaRef ds:uri="37f8ee66-e861-4fad-b6ec-7ec50ddbf115"/>
+    <ds:schemaRef ds:uri="http://www.w3.org/XML/1998/namespace"/>
+    <ds:schemaRef ds:uri="http://purl.org/dc/dcmitype/"/>
+  </ds:schemaRefs>
+</ds:datastoreItem>
+</file>
+
+<file path=customXml/itemProps2.xml><?xml version="1.0" encoding="utf-8"?>
 <ds:datastoreItem xmlns:ds="http://schemas.openxmlformats.org/officeDocument/2006/customXml" ds:itemID="{7B1DC283-0C0E-4656-9B29-B4F3EC4D0924}">
   <ds:schemaRefs>
     <ds:schemaRef ds:uri="http://schemas.microsoft.com/office/2006/metadata/contentType"/>
@@ -9468,23 +9639,6 @@
 </ds:datastoreItem>
 </file>
 
-<file path=customXml/itemProps2.xml><?xml version="1.0" encoding="utf-8"?>
-<ds:datastoreItem xmlns:ds="http://schemas.openxmlformats.org/officeDocument/2006/customXml" ds:itemID="{7FDF9755-4989-4011-A0C8-F73BCB73BCB3}">
-  <ds:schemaRefs>
-    <ds:schemaRef ds:uri="http://schemas.microsoft.com/office/2006/documentManagement/types"/>
-    <ds:schemaRef ds:uri="http://schemas.microsoft.com/office/infopath/2007/PartnerControls"/>
-    <ds:schemaRef ds:uri="http://purl.org/dc/elements/1.1/"/>
-    <ds:schemaRef ds:uri="http://schemas.microsoft.com/office/2006/metadata/properties"/>
-    <ds:schemaRef ds:uri="7eb914d0-ee65-4b36-817b-6b50d787ca6f"/>
-    <ds:schemaRef ds:uri="http://purl.org/dc/terms/"/>
-    <ds:schemaRef ds:uri="http://schemas.openxmlformats.org/package/2006/metadata/core-properties"/>
-    <ds:schemaRef ds:uri="37f8ee66-e861-4fad-b6ec-7ec50ddbf115"/>
-    <ds:schemaRef ds:uri="http://www.w3.org/XML/1998/namespace"/>
-    <ds:schemaRef ds:uri="http://purl.org/dc/dcmitype/"/>
-  </ds:schemaRefs>
-</ds:datastoreItem>
-</file>
-
 <file path=customXml/itemProps3.xml><?xml version="1.0" encoding="utf-8"?>
 <ds:datastoreItem xmlns:ds="http://schemas.openxmlformats.org/officeDocument/2006/customXml" ds:itemID="{BEB40948-A13B-4707-81BB-EDDB4BDDDE1C}">
   <ds:schemaRefs>

</xml_diff>